<commit_message>
Updated ppt (NullableContextOptions changed into Nullable since .net core preview 6)
</commit_message>
<xml_diff>
--- a/C# 8.0.pptx
+++ b/C# 8.0.pptx
@@ -325,7 +325,7 @@
           <a:p>
             <a:fld id="{C0A488A5-B519-4B90-92F4-B209740CFC66}" type="datetimeFigureOut">
               <a:rPr lang="en-US" smtClean="0"/>
-              <a:t>8/13/2019</a:t>
+              <a:t>8/14/2019</a:t>
             </a:fld>
             <a:endParaRPr lang="en-US"/>
           </a:p>
@@ -623,7 +623,7 @@
           <a:p>
             <a:fld id="{C0A488A5-B519-4B90-92F4-B209740CFC66}" type="datetimeFigureOut">
               <a:rPr lang="en-US" smtClean="0"/>
-              <a:t>8/13/2019</a:t>
+              <a:t>8/14/2019</a:t>
             </a:fld>
             <a:endParaRPr lang="en-US"/>
           </a:p>
@@ -815,7 +815,7 @@
           <a:p>
             <a:fld id="{C0A488A5-B519-4B90-92F4-B209740CFC66}" type="datetimeFigureOut">
               <a:rPr lang="en-US" smtClean="0"/>
-              <a:t>8/13/2019</a:t>
+              <a:t>8/14/2019</a:t>
             </a:fld>
             <a:endParaRPr lang="en-US"/>
           </a:p>
@@ -1076,7 +1076,7 @@
           <a:p>
             <a:fld id="{C0A488A5-B519-4B90-92F4-B209740CFC66}" type="datetimeFigureOut">
               <a:rPr lang="en-US" smtClean="0"/>
-              <a:t>8/13/2019</a:t>
+              <a:t>8/14/2019</a:t>
             </a:fld>
             <a:endParaRPr lang="en-US"/>
           </a:p>
@@ -1500,7 +1500,7 @@
           <a:p>
             <a:fld id="{C0A488A5-B519-4B90-92F4-B209740CFC66}" type="datetimeFigureOut">
               <a:rPr lang="en-US" smtClean="0"/>
-              <a:t>8/13/2019</a:t>
+              <a:t>8/14/2019</a:t>
             </a:fld>
             <a:endParaRPr lang="en-US"/>
           </a:p>
@@ -2037,7 +2037,7 @@
           <a:p>
             <a:fld id="{C0A488A5-B519-4B90-92F4-B209740CFC66}" type="datetimeFigureOut">
               <a:rPr lang="en-US" smtClean="0"/>
-              <a:t>8/13/2019</a:t>
+              <a:t>8/14/2019</a:t>
             </a:fld>
             <a:endParaRPr lang="en-US"/>
           </a:p>
@@ -2901,7 +2901,7 @@
           <a:p>
             <a:fld id="{C0A488A5-B519-4B90-92F4-B209740CFC66}" type="datetimeFigureOut">
               <a:rPr lang="en-US" smtClean="0"/>
-              <a:t>8/13/2019</a:t>
+              <a:t>8/14/2019</a:t>
             </a:fld>
             <a:endParaRPr lang="en-US"/>
           </a:p>
@@ -3071,7 +3071,7 @@
           <a:p>
             <a:fld id="{C0A488A5-B519-4B90-92F4-B209740CFC66}" type="datetimeFigureOut">
               <a:rPr lang="en-US" smtClean="0"/>
-              <a:t>8/13/2019</a:t>
+              <a:t>8/14/2019</a:t>
             </a:fld>
             <a:endParaRPr lang="en-US"/>
           </a:p>
@@ -3255,7 +3255,7 @@
           <a:p>
             <a:fld id="{C0A488A5-B519-4B90-92F4-B209740CFC66}" type="datetimeFigureOut">
               <a:rPr lang="en-US" smtClean="0"/>
-              <a:t>8/13/2019</a:t>
+              <a:t>8/14/2019</a:t>
             </a:fld>
             <a:endParaRPr lang="en-US"/>
           </a:p>
@@ -3425,7 +3425,7 @@
           <a:p>
             <a:fld id="{C0A488A5-B519-4B90-92F4-B209740CFC66}" type="datetimeFigureOut">
               <a:rPr lang="en-US" smtClean="0"/>
-              <a:t>8/13/2019</a:t>
+              <a:t>8/14/2019</a:t>
             </a:fld>
             <a:endParaRPr lang="en-US"/>
           </a:p>
@@ -3669,7 +3669,7 @@
           <a:p>
             <a:fld id="{C0A488A5-B519-4B90-92F4-B209740CFC66}" type="datetimeFigureOut">
               <a:rPr lang="en-US" smtClean="0"/>
-              <a:t>8/13/2019</a:t>
+              <a:t>8/14/2019</a:t>
             </a:fld>
             <a:endParaRPr lang="en-US"/>
           </a:p>
@@ -3905,7 +3905,7 @@
           <a:p>
             <a:fld id="{C0A488A5-B519-4B90-92F4-B209740CFC66}" type="datetimeFigureOut">
               <a:rPr lang="en-US" smtClean="0"/>
-              <a:t>8/13/2019</a:t>
+              <a:t>8/14/2019</a:t>
             </a:fld>
             <a:endParaRPr lang="en-US"/>
           </a:p>
@@ -4371,7 +4371,7 @@
           <a:p>
             <a:fld id="{C0A488A5-B519-4B90-92F4-B209740CFC66}" type="datetimeFigureOut">
               <a:rPr lang="en-US" smtClean="0"/>
-              <a:t>8/13/2019</a:t>
+              <a:t>8/14/2019</a:t>
             </a:fld>
             <a:endParaRPr lang="en-US"/>
           </a:p>
@@ -4489,7 +4489,7 @@
           <a:p>
             <a:fld id="{C0A488A5-B519-4B90-92F4-B209740CFC66}" type="datetimeFigureOut">
               <a:rPr lang="en-US" smtClean="0"/>
-              <a:t>8/13/2019</a:t>
+              <a:t>8/14/2019</a:t>
             </a:fld>
             <a:endParaRPr lang="en-US"/>
           </a:p>
@@ -4584,7 +4584,7 @@
           <a:p>
             <a:fld id="{C0A488A5-B519-4B90-92F4-B209740CFC66}" type="datetimeFigureOut">
               <a:rPr lang="en-US" smtClean="0"/>
-              <a:t>8/13/2019</a:t>
+              <a:t>8/14/2019</a:t>
             </a:fld>
             <a:endParaRPr lang="en-US"/>
           </a:p>
@@ -4839,7 +4839,7 @@
           <a:p>
             <a:fld id="{C0A488A5-B519-4B90-92F4-B209740CFC66}" type="datetimeFigureOut">
               <a:rPr lang="en-US" smtClean="0"/>
-              <a:t>8/13/2019</a:t>
+              <a:t>8/14/2019</a:t>
             </a:fld>
             <a:endParaRPr lang="en-US"/>
           </a:p>
@@ -5139,7 +5139,7 @@
           <a:p>
             <a:fld id="{C0A488A5-B519-4B90-92F4-B209740CFC66}" type="datetimeFigureOut">
               <a:rPr lang="en-US" smtClean="0"/>
-              <a:t>8/13/2019</a:t>
+              <a:t>8/14/2019</a:t>
             </a:fld>
             <a:endParaRPr lang="en-US"/>
           </a:p>
@@ -5373,7 +5373,7 @@
           <a:p>
             <a:fld id="{C0A488A5-B519-4B90-92F4-B209740CFC66}" type="datetimeFigureOut">
               <a:rPr lang="en-US" smtClean="0"/>
-              <a:t>8/13/2019</a:t>
+              <a:t>8/14/2019</a:t>
             </a:fld>
             <a:endParaRPr lang="en-US"/>
           </a:p>
@@ -7157,23 +7157,7 @@
             </a:br>
             <a:r>
               <a:rPr lang="en-US" dirty="0"/>
-              <a:t>    &lt;</a:t>
-            </a:r>
-            <a:r>
-              <a:rPr lang="en-US" dirty="0" err="1"/>
-              <a:t>NullableContextOptions</a:t>
-            </a:r>
-            <a:r>
-              <a:rPr lang="en-US" dirty="0"/>
-              <a:t>&gt;enable&lt;/</a:t>
-            </a:r>
-            <a:r>
-              <a:rPr lang="en-US" dirty="0" err="1"/>
-              <a:t>NullableContextOptions</a:t>
-            </a:r>
-            <a:r>
-              <a:rPr lang="en-US" dirty="0"/>
-              <a:t>&gt;</a:t>
+              <a:t>    &lt;Nullable&gt;enable&lt;/Nullable&gt;</a:t>
             </a:r>
           </a:p>
           <a:p>
@@ -7897,23 +7881,7 @@
           <a:p>
             <a:r>
               <a:rPr lang="en-US" sz="1400" dirty="0"/>
-              <a:t>&lt;</a:t>
-            </a:r>
-            <a:r>
-              <a:rPr lang="en-US" sz="1400" dirty="0" err="1"/>
-              <a:t>NullableContextOptions</a:t>
-            </a:r>
-            <a:r>
-              <a:rPr lang="en-US" sz="1400" dirty="0"/>
-              <a:t>&gt;enable&lt;/</a:t>
-            </a:r>
-            <a:r>
-              <a:rPr lang="en-US" sz="1400" dirty="0" err="1"/>
-              <a:t>NullableContextOptions</a:t>
-            </a:r>
-            <a:r>
-              <a:rPr lang="en-US" sz="1400" dirty="0"/>
-              <a:t>&gt;</a:t>
+              <a:t>&lt;Nullable&gt;enable&lt;/Nullable&gt;</a:t>
             </a:r>
             <a:endParaRPr lang="ro-RO" sz="1400" dirty="0"/>
           </a:p>

</xml_diff>

<commit_message>
made a few corrections
</commit_message>
<xml_diff>
--- a/C# 8.0.pptx
+++ b/C# 8.0.pptx
@@ -9111,24 +9111,24 @@
           </a:p>
           <a:p>
             <a:r>
-              <a:rPr lang="en-US" dirty="0"/>
-              <a:t>Nullable? =&gt; </a:t>
-            </a:r>
-            <a:r>
               <a:rPr lang="en-US" dirty="0" err="1"/>
               <a:t>NonNullable</a:t>
             </a:r>
-            <a:endParaRPr lang="en-US" dirty="0"/>
-          </a:p>
-          <a:p>
+            <a:r>
+              <a:rPr lang="en-US" dirty="0"/>
+              <a:t>? =&gt; Nullable</a:t>
+            </a:r>
+          </a:p>
+          <a:p>
+            <a:r>
+              <a:rPr lang="en-US"/>
+              <a:t>Nullable =&gt; </a:t>
+            </a:r>
             <a:r>
               <a:rPr lang="en-US" dirty="0" err="1"/>
               <a:t>NonNullable</a:t>
             </a:r>
-            <a:r>
-              <a:rPr lang="en-US" dirty="0"/>
-              <a:t>! =&gt; Nullable</a:t>
-            </a:r>
+            <a:endParaRPr lang="en-US" dirty="0"/>
           </a:p>
         </p:txBody>
       </p:sp>

</xml_diff>